<commit_message>
03 Tests - extended presentation by tips
</commit_message>
<xml_diff>
--- a/Lectures/IW5_03_AutomatedTesting.pptx
+++ b/Lectures/IW5_03_AutomatedTesting.pptx
@@ -13,6 +13,7 @@
     <p:sldId id="260" r:id="rId7"/>
     <p:sldId id="261" r:id="rId8"/>
     <p:sldId id="262" r:id="rId9"/>
+    <p:sldId id="264" r:id="rId10"/>
   </p:sldIdLst>
   <p:sldSz cx="12192000" cy="6858000"/>
   <p:notesSz cx="6858000" cy="9144000"/>
@@ -6659,7 +6660,17 @@
           <a:p>
             <a:r>
               <a:rPr lang="cs-CZ" baseline="0" dirty="0" smtClean="0"/>
-              <a:t>Typické Asserty: IsTrue, AreEqual, IsInRange, Throws atd.</a:t>
+              <a:t>Typické Asserty: IsTrue, AreEqual, IsInRange, Throws atd</a:t>
+            </a:r>
+            <a:r>
+              <a:rPr lang="cs-CZ" baseline="0" dirty="0" smtClean="0"/>
+              <a:t>.</a:t>
+            </a:r>
+          </a:p>
+          <a:p>
+            <a:r>
+              <a:rPr lang="cs-CZ" baseline="0" dirty="0" smtClean="0"/>
+              <a:t>Oveření, že dojde k výjimce je možné pomocí ExpectedException attributu</a:t>
             </a:r>
             <a:endParaRPr lang="en-US" dirty="0"/>
           </a:p>
@@ -6912,9 +6923,12 @@
             <a:pPr lvl="1"/>
             <a:r>
               <a:rPr lang="cs-CZ" dirty="0" smtClean="0"/>
-              <a:t>Obnovení databáze ze zálohy</a:t>
-            </a:r>
-            <a:endParaRPr lang="en-US" dirty="0"/>
+              <a:t>Obnovení databáze ze </a:t>
+            </a:r>
+            <a:r>
+              <a:rPr lang="cs-CZ" dirty="0" smtClean="0"/>
+              <a:t>zálohy</a:t>
+            </a:r>
           </a:p>
         </p:txBody>
       </p:sp>
@@ -6922,6 +6936,120 @@
     <p:extLst>
       <p:ext uri="{BB962C8B-B14F-4D97-AF65-F5344CB8AC3E}">
         <p14:creationId xmlns:p14="http://schemas.microsoft.com/office/powerpoint/2010/main" val="1687265610"/>
+      </p:ext>
+    </p:extLst>
+  </p:cSld>
+  <p:clrMapOvr>
+    <a:masterClrMapping/>
+  </p:clrMapOvr>
+</p:sld>
+</file>
+
+<file path=ppt/slides/slide9.xml><?xml version="1.0" encoding="utf-8"?>
+<p:sld xmlns:a="http://schemas.openxmlformats.org/drawingml/2006/main" xmlns:r="http://schemas.openxmlformats.org/officeDocument/2006/relationships" xmlns:p="http://schemas.openxmlformats.org/presentationml/2006/main">
+  <p:cSld>
+    <p:spTree>
+      <p:nvGrpSpPr>
+        <p:cNvPr id="1" name=""/>
+        <p:cNvGrpSpPr/>
+        <p:nvPr/>
+      </p:nvGrpSpPr>
+      <p:grpSpPr>
+        <a:xfrm>
+          <a:off x="0" y="0"/>
+          <a:ext cx="0" cy="0"/>
+          <a:chOff x="0" y="0"/>
+          <a:chExt cx="0" cy="0"/>
+        </a:xfrm>
+      </p:grpSpPr>
+      <p:sp>
+        <p:nvSpPr>
+          <p:cNvPr id="2" name="Title 1"/>
+          <p:cNvSpPr>
+            <a:spLocks noGrp="1"/>
+          </p:cNvSpPr>
+          <p:nvPr>
+            <p:ph type="title"/>
+          </p:nvPr>
+        </p:nvSpPr>
+        <p:spPr/>
+        <p:txBody>
+          <a:bodyPr/>
+          <a:lstStyle/>
+          <a:p>
+            <a:r>
+              <a:rPr lang="cs-CZ" dirty="0" smtClean="0"/>
+              <a:t>Tipy</a:t>
+            </a:r>
+            <a:endParaRPr lang="en-US" dirty="0"/>
+          </a:p>
+        </p:txBody>
+      </p:sp>
+      <p:sp>
+        <p:nvSpPr>
+          <p:cNvPr id="3" name="Content Placeholder 2"/>
+          <p:cNvSpPr>
+            <a:spLocks noGrp="1"/>
+          </p:cNvSpPr>
+          <p:nvPr>
+            <p:ph idx="1"/>
+          </p:nvPr>
+        </p:nvSpPr>
+        <p:spPr>
+          <a:xfrm>
+            <a:off x="467360" y="1757680"/>
+            <a:ext cx="11581385" cy="4695698"/>
+          </a:xfrm>
+        </p:spPr>
+        <p:txBody>
+          <a:bodyPr/>
+          <a:lstStyle/>
+          <a:p>
+            <a:pPr lvl="0"/>
+            <a:r>
+              <a:rPr lang="cs-CZ" dirty="0" smtClean="0"/>
+              <a:t>Testovat internal lze přidáním</a:t>
+            </a:r>
+            <a:r>
+              <a:rPr lang="cs-CZ" baseline="0" dirty="0" smtClean="0"/>
+              <a:t> atributu „InternalsVisibleTo“</a:t>
+            </a:r>
+          </a:p>
+          <a:p>
+            <a:pPr lvl="0"/>
+            <a:r>
+              <a:rPr lang="cs-CZ" baseline="0" dirty="0" smtClean="0"/>
+              <a:t>Test lze označit za nefunkční pomocí „Ignore“ atributu</a:t>
+            </a:r>
+          </a:p>
+          <a:p>
+            <a:pPr lvl="0"/>
+            <a:r>
+              <a:rPr lang="cs-CZ" baseline="0" dirty="0" smtClean="0"/>
+              <a:t>Seskupit testy lze pomocí „Category“ atributu</a:t>
+            </a:r>
+          </a:p>
+          <a:p>
+            <a:pPr lvl="0"/>
+            <a:r>
+              <a:rPr lang="cs-CZ" baseline="0" dirty="0" smtClean="0"/>
+              <a:t>Deployment attribut umožňuje vypublikovat soubor do testovacího adresáře</a:t>
+            </a:r>
+          </a:p>
+          <a:p>
+            <a:pPr lvl="0"/>
+            <a:r>
+              <a:rPr lang="cs-CZ" baseline="0" dirty="0" smtClean="0"/>
+              <a:t>TestContext – přístup k aktuálnímu nastavení testu</a:t>
+            </a:r>
+            <a:endParaRPr lang="en-US" dirty="0"/>
+          </a:p>
+        </p:txBody>
+      </p:sp>
+    </p:spTree>
+    <p:extLst>
+      <p:ext uri="{BB962C8B-B14F-4D97-AF65-F5344CB8AC3E}">
+        <p14:creationId xmlns:p14="http://schemas.microsoft.com/office/powerpoint/2010/main" val="1725339350"/>
       </p:ext>
     </p:extLst>
   </p:cSld>

</xml_diff>